<commit_message>
adding april 14 slides and amending some of the class descriptions
</commit_message>
<xml_diff>
--- a/slides/april12.pptx
+++ b/slides/april12.pptx
@@ -26059,7 +26059,7 @@
           <a:p>
             <a:r>
               <a:rPr lang="en-US" dirty="0"/>
-              <a:t>Figure or table of simulation results </a:t>
+              <a:t>Figure and table of simulation results </a:t>
             </a:r>
           </a:p>
           <a:p>
@@ -26072,11 +26072,11 @@
             <a:pPr lvl="1"/>
             <a:r>
               <a:rPr lang="en-US" dirty="0"/>
-              <a:t>Identify main pattern between levels of Independent Variable </a:t>
+              <a:t>Identify main pattern between levels of independent variable </a:t>
             </a:r>
           </a:p>
           <a:p>
-            <a:pPr lvl="1"/>
+            <a:pPr lvl="2"/>
             <a:r>
               <a:rPr lang="en-US" dirty="0"/>
               <a:t>Break down by behaviors </a:t>

</xml_diff>